<commit_message>
after some live changes
</commit_message>
<xml_diff>
--- a/Spring Security-MVC-1.pptx
+++ b/Spring Security-MVC-1.pptx
@@ -8278,7 +8278,19 @@
             </a:pPr>
             <a:r>
               <a:rPr lang="en-IN" i="1" dirty="0" smtClean="0"/>
-              <a:t>We have all these paged mapped in the </a:t>
+              <a:t>We have all </a:t>
+            </a:r>
+            <a:r>
+              <a:rPr lang="en-IN" i="1" smtClean="0"/>
+              <a:t>these </a:t>
+            </a:r>
+            <a:r>
+              <a:rPr lang="en-IN" i="1" smtClean="0"/>
+              <a:t>pages </a:t>
+            </a:r>
+            <a:r>
+              <a:rPr lang="en-IN" i="1" dirty="0" smtClean="0"/>
+              <a:t>mapped in the </a:t>
             </a:r>
             <a:r>
               <a:rPr lang="en-IN" b="1" dirty="0" smtClean="0">
@@ -8440,13 +8452,13 @@
   <p:clrMapOvr>
     <a:masterClrMapping/>
   </p:clrMapOvr>
-  <mc:AlternateContent xmlns:mc="http://schemas.openxmlformats.org/markup-compatibility/2006">
-    <mc:Choice xmlns:p14="http://schemas.microsoft.com/office/powerpoint/2010/main" Requires="p14">
+  <mc:AlternateContent xmlns:mc="http://schemas.openxmlformats.org/markup-compatibility/2006" xmlns:p14="http://schemas.microsoft.com/office/powerpoint/2010/main">
+    <mc:Choice Requires="p14">
       <p:transition spd="med" p14:dur="700">
         <p:fade/>
       </p:transition>
     </mc:Choice>
-    <mc:Fallback>
+    <mc:Fallback xmlns="">
       <p:transition spd="med">
         <p:fade/>
       </p:transition>
@@ -8604,13 +8616,13 @@
   <p:clrMapOvr>
     <a:masterClrMapping/>
   </p:clrMapOvr>
-  <mc:AlternateContent xmlns:mc="http://schemas.openxmlformats.org/markup-compatibility/2006">
-    <mc:Choice xmlns:p14="http://schemas.microsoft.com/office/powerpoint/2010/main" Requires="p14">
+  <mc:AlternateContent xmlns:mc="http://schemas.openxmlformats.org/markup-compatibility/2006" xmlns:p14="http://schemas.microsoft.com/office/powerpoint/2010/main">
+    <mc:Choice Requires="p14">
       <p:transition spd="med" p14:dur="700">
         <p:fade/>
       </p:transition>
     </mc:Choice>
-    <mc:Fallback>
+    <mc:Fallback xmlns="">
       <p:transition spd="med">
         <p:fade/>
       </p:transition>
@@ -8814,13 +8826,13 @@
   <p:clrMapOvr>
     <a:masterClrMapping/>
   </p:clrMapOvr>
-  <mc:AlternateContent xmlns:mc="http://schemas.openxmlformats.org/markup-compatibility/2006">
-    <mc:Choice xmlns:p14="http://schemas.microsoft.com/office/powerpoint/2010/main" Requires="p14">
+  <mc:AlternateContent xmlns:mc="http://schemas.openxmlformats.org/markup-compatibility/2006" xmlns:p14="http://schemas.microsoft.com/office/powerpoint/2010/main">
+    <mc:Choice Requires="p14">
       <p:transition spd="med" p14:dur="700">
         <p:fade/>
       </p:transition>
     </mc:Choice>
-    <mc:Fallback>
+    <mc:Fallback xmlns="">
       <p:transition spd="med">
         <p:fade/>
       </p:transition>
@@ -9460,13 +9472,13 @@
   <p:clrMapOvr>
     <a:masterClrMapping/>
   </p:clrMapOvr>
-  <mc:AlternateContent xmlns:mc="http://schemas.openxmlformats.org/markup-compatibility/2006">
-    <mc:Choice xmlns:p14="http://schemas.microsoft.com/office/powerpoint/2010/main" Requires="p14">
+  <mc:AlternateContent xmlns:mc="http://schemas.openxmlformats.org/markup-compatibility/2006" xmlns:p14="http://schemas.microsoft.com/office/powerpoint/2010/main">
+    <mc:Choice Requires="p14">
       <p:transition spd="med" p14:dur="700">
         <p:fade/>
       </p:transition>
     </mc:Choice>
-    <mc:Fallback>
+    <mc:Fallback xmlns="">
       <p:transition spd="med">
         <p:fade/>
       </p:transition>
@@ -10022,7 +10034,6 @@
               <a:rPr lang="en-IN" dirty="0" smtClean="0"/>
               <a:t>?</a:t>
             </a:r>
-            <a:endParaRPr lang="en-IN" dirty="0" smtClean="0"/>
           </a:p>
         </p:txBody>
       </p:sp>
@@ -10036,13 +10047,13 @@
   <p:clrMapOvr>
     <a:masterClrMapping/>
   </p:clrMapOvr>
-  <mc:AlternateContent xmlns:mc="http://schemas.openxmlformats.org/markup-compatibility/2006">
-    <mc:Choice xmlns:p14="http://schemas.microsoft.com/office/powerpoint/2010/main" Requires="p14">
+  <mc:AlternateContent xmlns:mc="http://schemas.openxmlformats.org/markup-compatibility/2006" xmlns:p14="http://schemas.microsoft.com/office/powerpoint/2010/main">
+    <mc:Choice Requires="p14">
       <p:transition spd="med" p14:dur="700">
         <p:fade/>
       </p:transition>
     </mc:Choice>
-    <mc:Fallback>
+    <mc:Fallback xmlns="">
       <p:transition spd="med">
         <p:fade/>
       </p:transition>
@@ -10473,13 +10484,13 @@
   <p:clrMapOvr>
     <a:masterClrMapping/>
   </p:clrMapOvr>
-  <mc:AlternateContent xmlns:mc="http://schemas.openxmlformats.org/markup-compatibility/2006">
-    <mc:Choice xmlns:p14="http://schemas.microsoft.com/office/powerpoint/2010/main" Requires="p14">
+  <mc:AlternateContent xmlns:mc="http://schemas.openxmlformats.org/markup-compatibility/2006" xmlns:p14="http://schemas.microsoft.com/office/powerpoint/2010/main">
+    <mc:Choice Requires="p14">
       <p:transition spd="med" p14:dur="700">
         <p:fade/>
       </p:transition>
     </mc:Choice>
-    <mc:Fallback>
+    <mc:Fallback xmlns="">
       <p:transition spd="med">
         <p:fade/>
       </p:transition>
@@ -10770,13 +10781,13 @@
   <p:clrMapOvr>
     <a:masterClrMapping/>
   </p:clrMapOvr>
-  <mc:AlternateContent xmlns:mc="http://schemas.openxmlformats.org/markup-compatibility/2006">
-    <mc:Choice xmlns:p14="http://schemas.microsoft.com/office/powerpoint/2010/main" Requires="p14">
+  <mc:AlternateContent xmlns:mc="http://schemas.openxmlformats.org/markup-compatibility/2006" xmlns:p14="http://schemas.microsoft.com/office/powerpoint/2010/main">
+    <mc:Choice Requires="p14">
       <p:transition spd="med" p14:dur="700">
         <p:fade/>
       </p:transition>
     </mc:Choice>
-    <mc:Fallback>
+    <mc:Fallback xmlns="">
       <p:transition spd="med">
         <p:fade/>
       </p:transition>
@@ -11163,13 +11174,13 @@
   <p:clrMapOvr>
     <a:masterClrMapping/>
   </p:clrMapOvr>
-  <mc:AlternateContent xmlns:mc="http://schemas.openxmlformats.org/markup-compatibility/2006">
-    <mc:Choice xmlns:p14="http://schemas.microsoft.com/office/powerpoint/2010/main" Requires="p14">
+  <mc:AlternateContent xmlns:mc="http://schemas.openxmlformats.org/markup-compatibility/2006" xmlns:p14="http://schemas.microsoft.com/office/powerpoint/2010/main">
+    <mc:Choice Requires="p14">
       <p:transition spd="med" p14:dur="700">
         <p:fade/>
       </p:transition>
     </mc:Choice>
-    <mc:Fallback>
+    <mc:Fallback xmlns="">
       <p:transition spd="med">
         <p:fade/>
       </p:transition>
@@ -11915,13 +11926,13 @@
   <p:clrMapOvr>
     <a:masterClrMapping/>
   </p:clrMapOvr>
-  <mc:AlternateContent xmlns:mc="http://schemas.openxmlformats.org/markup-compatibility/2006">
-    <mc:Choice xmlns:p14="http://schemas.microsoft.com/office/powerpoint/2010/main" Requires="p14">
+  <mc:AlternateContent xmlns:mc="http://schemas.openxmlformats.org/markup-compatibility/2006" xmlns:p14="http://schemas.microsoft.com/office/powerpoint/2010/main">
+    <mc:Choice Requires="p14">
       <p:transition spd="med" p14:dur="700">
         <p:fade/>
       </p:transition>
     </mc:Choice>
-    <mc:Fallback>
+    <mc:Fallback xmlns="">
       <p:transition spd="med">
         <p:fade/>
       </p:transition>
@@ -12322,13 +12333,13 @@
   <p:clrMapOvr>
     <a:masterClrMapping/>
   </p:clrMapOvr>
-  <mc:AlternateContent xmlns:mc="http://schemas.openxmlformats.org/markup-compatibility/2006">
-    <mc:Choice xmlns:p14="http://schemas.microsoft.com/office/powerpoint/2010/main" Requires="p14">
+  <mc:AlternateContent xmlns:mc="http://schemas.openxmlformats.org/markup-compatibility/2006" xmlns:p14="http://schemas.microsoft.com/office/powerpoint/2010/main">
+    <mc:Choice Requires="p14">
       <p:transition spd="med" p14:dur="700">
         <p:fade/>
       </p:transition>
     </mc:Choice>
-    <mc:Fallback>
+    <mc:Fallback xmlns="">
       <p:transition spd="med">
         <p:fade/>
       </p:transition>
@@ -18183,7 +18194,6 @@
               <a:rPr lang="en-IN" dirty="0" smtClean="0"/>
               <a:t>Let’s discuss a while later</a:t>
             </a:r>
-            <a:endParaRPr lang="en-IN" dirty="0" smtClean="0"/>
           </a:p>
         </p:txBody>
       </p:sp>
@@ -19272,13 +19282,13 @@
   <p:clrMapOvr>
     <a:masterClrMapping/>
   </p:clrMapOvr>
-  <mc:AlternateContent xmlns:mc="http://schemas.openxmlformats.org/markup-compatibility/2006">
-    <mc:Choice xmlns:p14="http://schemas.microsoft.com/office/powerpoint/2010/main" Requires="p14">
+  <mc:AlternateContent xmlns:mc="http://schemas.openxmlformats.org/markup-compatibility/2006" xmlns:p14="http://schemas.microsoft.com/office/powerpoint/2010/main">
+    <mc:Choice Requires="p14">
       <p:transition spd="med" p14:dur="700">
         <p:fade/>
       </p:transition>
     </mc:Choice>
-    <mc:Fallback>
+    <mc:Fallback xmlns="">
       <p:transition spd="med">
         <p:fade/>
       </p:transition>

</xml_diff>